<commit_message>
[PLANNING] Tareas de ingesta de datos definidas a 18/12/2020
</commit_message>
<xml_diff>
--- a/Documentacion/Diseño funcional y modelos.pptx
+++ b/Documentacion/Diseño funcional y modelos.pptx
@@ -265,7 +265,7 @@
           <a:p>
             <a:fld id="{33C8F781-4471-4207-AA15-D02BAF5FD67C}" type="datetimeFigureOut">
               <a:rPr lang="es-ES" smtClean="0"/>
-              <a:t>07/12/2020</a:t>
+              <a:t>18/12/2020</a:t>
             </a:fld>
             <a:endParaRPr lang="es-ES"/>
           </a:p>
@@ -463,7 +463,7 @@
           <a:p>
             <a:fld id="{33C8F781-4471-4207-AA15-D02BAF5FD67C}" type="datetimeFigureOut">
               <a:rPr lang="es-ES" smtClean="0"/>
-              <a:t>07/12/2020</a:t>
+              <a:t>18/12/2020</a:t>
             </a:fld>
             <a:endParaRPr lang="es-ES"/>
           </a:p>
@@ -671,7 +671,7 @@
           <a:p>
             <a:fld id="{33C8F781-4471-4207-AA15-D02BAF5FD67C}" type="datetimeFigureOut">
               <a:rPr lang="es-ES" smtClean="0"/>
-              <a:t>07/12/2020</a:t>
+              <a:t>18/12/2020</a:t>
             </a:fld>
             <a:endParaRPr lang="es-ES"/>
           </a:p>
@@ -869,7 +869,7 @@
           <a:p>
             <a:fld id="{33C8F781-4471-4207-AA15-D02BAF5FD67C}" type="datetimeFigureOut">
               <a:rPr lang="es-ES" smtClean="0"/>
-              <a:t>07/12/2020</a:t>
+              <a:t>18/12/2020</a:t>
             </a:fld>
             <a:endParaRPr lang="es-ES"/>
           </a:p>
@@ -1144,7 +1144,7 @@
           <a:p>
             <a:fld id="{33C8F781-4471-4207-AA15-D02BAF5FD67C}" type="datetimeFigureOut">
               <a:rPr lang="es-ES" smtClean="0"/>
-              <a:t>07/12/2020</a:t>
+              <a:t>18/12/2020</a:t>
             </a:fld>
             <a:endParaRPr lang="es-ES"/>
           </a:p>
@@ -1409,7 +1409,7 @@
           <a:p>
             <a:fld id="{33C8F781-4471-4207-AA15-D02BAF5FD67C}" type="datetimeFigureOut">
               <a:rPr lang="es-ES" smtClean="0"/>
-              <a:t>07/12/2020</a:t>
+              <a:t>18/12/2020</a:t>
             </a:fld>
             <a:endParaRPr lang="es-ES"/>
           </a:p>
@@ -1821,7 +1821,7 @@
           <a:p>
             <a:fld id="{33C8F781-4471-4207-AA15-D02BAF5FD67C}" type="datetimeFigureOut">
               <a:rPr lang="es-ES" smtClean="0"/>
-              <a:t>07/12/2020</a:t>
+              <a:t>18/12/2020</a:t>
             </a:fld>
             <a:endParaRPr lang="es-ES"/>
           </a:p>
@@ -1962,7 +1962,7 @@
           <a:p>
             <a:fld id="{33C8F781-4471-4207-AA15-D02BAF5FD67C}" type="datetimeFigureOut">
               <a:rPr lang="es-ES" smtClean="0"/>
-              <a:t>07/12/2020</a:t>
+              <a:t>18/12/2020</a:t>
             </a:fld>
             <a:endParaRPr lang="es-ES"/>
           </a:p>
@@ -2075,7 +2075,7 @@
           <a:p>
             <a:fld id="{33C8F781-4471-4207-AA15-D02BAF5FD67C}" type="datetimeFigureOut">
               <a:rPr lang="es-ES" smtClean="0"/>
-              <a:t>07/12/2020</a:t>
+              <a:t>18/12/2020</a:t>
             </a:fld>
             <a:endParaRPr lang="es-ES"/>
           </a:p>
@@ -2386,7 +2386,7 @@
           <a:p>
             <a:fld id="{33C8F781-4471-4207-AA15-D02BAF5FD67C}" type="datetimeFigureOut">
               <a:rPr lang="es-ES" smtClean="0"/>
-              <a:t>07/12/2020</a:t>
+              <a:t>18/12/2020</a:t>
             </a:fld>
             <a:endParaRPr lang="es-ES"/>
           </a:p>
@@ -2674,7 +2674,7 @@
           <a:p>
             <a:fld id="{33C8F781-4471-4207-AA15-D02BAF5FD67C}" type="datetimeFigureOut">
               <a:rPr lang="es-ES" smtClean="0"/>
-              <a:t>07/12/2020</a:t>
+              <a:t>18/12/2020</a:t>
             </a:fld>
             <a:endParaRPr lang="es-ES"/>
           </a:p>
@@ -2915,7 +2915,7 @@
           <a:p>
             <a:fld id="{33C8F781-4471-4207-AA15-D02BAF5FD67C}" type="datetimeFigureOut">
               <a:rPr lang="es-ES" smtClean="0"/>
-              <a:t>07/12/2020</a:t>
+              <a:t>18/12/2020</a:t>
             </a:fld>
             <a:endParaRPr lang="es-ES"/>
           </a:p>
@@ -4732,7 +4732,7 @@
         </p:nvCxnSpPr>
         <p:spPr>
           <a:xfrm flipV="1">
-            <a:off x="380882" y="5697780"/>
+            <a:off x="380882" y="4137426"/>
             <a:ext cx="2070770" cy="653"/>
           </a:xfrm>
           <a:prstGeom prst="straightConnector1">
@@ -4771,8 +4771,8 @@
         </p:nvSpPr>
         <p:spPr>
           <a:xfrm>
-            <a:off x="145109" y="3466087"/>
-            <a:ext cx="2328952" cy="2308324"/>
+            <a:off x="145109" y="2870468"/>
+            <a:ext cx="2328952" cy="1477328"/>
           </a:xfrm>
           <a:prstGeom prst="rect">
             <a:avLst/>
@@ -4789,7 +4789,7 @@
               <a:rPr lang="es-ES" dirty="0">
                 <a:latin typeface="LM Roman 10" panose="00000500000000000000" pitchFamily="50" charset="0"/>
               </a:rPr>
-              <a:t>Datos de la BBDD:</a:t>
+              <a:t>Datos de los CSV:</a:t>
             </a:r>
           </a:p>
           <a:p>
@@ -4801,7 +4801,7 @@
               <a:rPr lang="es-ES" dirty="0">
                 <a:latin typeface="LM Roman 10" panose="00000500000000000000" pitchFamily="50" charset="0"/>
               </a:rPr>
-              <a:t>Coches eléctricos</a:t>
+              <a:t>Coches eléctricos </a:t>
             </a:r>
           </a:p>
           <a:p>
@@ -4815,36 +4815,6 @@
               </a:rPr>
               <a:t>Puntos de recarga (latitud, longitud)</a:t>
             </a:r>
-          </a:p>
-          <a:p>
-            <a:pPr marL="285750" indent="-285750">
-              <a:buFontTx/>
-              <a:buChar char="-"/>
-            </a:pPr>
-            <a:r>
-              <a:rPr lang="es-ES" dirty="0">
-                <a:latin typeface="LM Roman 10" panose="00000500000000000000" pitchFamily="50" charset="0"/>
-              </a:rPr>
-              <a:t>Red de carreteras</a:t>
-            </a:r>
-          </a:p>
-          <a:p>
-            <a:pPr marL="285750" indent="-285750">
-              <a:buFontTx/>
-              <a:buChar char="-"/>
-            </a:pPr>
-            <a:r>
-              <a:rPr lang="es-ES" dirty="0">
-                <a:solidFill>
-                  <a:srgbClr val="00B0F0"/>
-                </a:solidFill>
-                <a:latin typeface="LM Roman 10" panose="00000500000000000000" pitchFamily="50" charset="0"/>
-              </a:rPr>
-              <a:t>Volumen de tráfico</a:t>
-            </a:r>
-            <a:endParaRPr lang="es-ES" dirty="0">
-              <a:latin typeface="LM Roman 10" panose="00000500000000000000" pitchFamily="50" charset="0"/>
-            </a:endParaRPr>
           </a:p>
           <a:p>
             <a:endParaRPr lang="es-ES" dirty="0">
@@ -4920,7 +4890,7 @@
         <p:spPr>
           <a:xfrm>
             <a:off x="2709836" y="1709992"/>
-            <a:ext cx="2697051" cy="1754326"/>
+            <a:ext cx="2697051" cy="1477328"/>
           </a:xfrm>
           <a:prstGeom prst="rect">
             <a:avLst/>
@@ -4934,22 +4904,10 @@
           <a:lstStyle/>
           <a:p>
             <a:r>
-              <a:rPr lang="es-ES" dirty="0" err="1">
-                <a:latin typeface="LM Roman 10" panose="00000500000000000000" pitchFamily="50" charset="0"/>
-              </a:rPr>
-              <a:t>Queries</a:t>
-            </a:r>
-            <a:r>
-              <a:rPr lang="es-ES" dirty="0">
-                <a:latin typeface="LM Roman 10" panose="00000500000000000000" pitchFamily="50" charset="0"/>
-              </a:rPr>
-              <a:t> a la </a:t>
-            </a:r>
-            <a:r>
               <a:rPr lang="es-ES" b="1" i="1" dirty="0">
                 <a:latin typeface="LM Roman 10" panose="00000500000000000000" pitchFamily="50" charset="0"/>
               </a:rPr>
-              <a:t>BBDD Coche </a:t>
+              <a:t>Coche </a:t>
             </a:r>
             <a:r>
               <a:rPr lang="es-ES" dirty="0">
@@ -5124,7 +5082,7 @@
         <p:spPr>
           <a:xfrm>
             <a:off x="5441615" y="3126573"/>
-            <a:ext cx="2269787" cy="1477328"/>
+            <a:ext cx="2269787" cy="1200329"/>
           </a:xfrm>
           <a:prstGeom prst="rect">
             <a:avLst/>
@@ -5138,22 +5096,10 @@
           <a:lstStyle/>
           <a:p>
             <a:r>
-              <a:rPr lang="es-ES" dirty="0" err="1">
-                <a:latin typeface="LM Roman 10" panose="00000500000000000000" pitchFamily="50" charset="0"/>
-              </a:rPr>
-              <a:t>Queries</a:t>
-            </a:r>
-            <a:r>
-              <a:rPr lang="es-ES" dirty="0">
-                <a:latin typeface="LM Roman 10" panose="00000500000000000000" pitchFamily="50" charset="0"/>
-              </a:rPr>
-              <a:t> a la </a:t>
-            </a:r>
-            <a:r>
               <a:rPr lang="es-ES" b="1" i="1" dirty="0">
                 <a:latin typeface="LM Roman 10" panose="00000500000000000000" pitchFamily="50" charset="0"/>
               </a:rPr>
-              <a:t>BBDD Red de carreteras  </a:t>
+              <a:t>Red de carreteras  </a:t>
             </a:r>
             <a:r>
               <a:rPr lang="es-ES" dirty="0">
@@ -5200,7 +5146,7 @@
         <p:spPr>
           <a:xfrm>
             <a:off x="8069658" y="4660248"/>
-            <a:ext cx="2448457" cy="1754326"/>
+            <a:ext cx="2448457" cy="1477328"/>
           </a:xfrm>
           <a:prstGeom prst="rect">
             <a:avLst/>
@@ -5214,22 +5160,10 @@
           <a:lstStyle/>
           <a:p>
             <a:r>
-              <a:rPr lang="es-ES" dirty="0" err="1">
-                <a:latin typeface="LM Roman 10" panose="00000500000000000000" pitchFamily="50" charset="0"/>
-              </a:rPr>
-              <a:t>Queries</a:t>
-            </a:r>
-            <a:r>
-              <a:rPr lang="es-ES" dirty="0">
-                <a:latin typeface="LM Roman 10" panose="00000500000000000000" pitchFamily="50" charset="0"/>
-              </a:rPr>
-              <a:t> a la </a:t>
-            </a:r>
-            <a:r>
               <a:rPr lang="es-ES" b="1" i="1" dirty="0">
                 <a:latin typeface="LM Roman 10" panose="00000500000000000000" pitchFamily="50" charset="0"/>
               </a:rPr>
-              <a:t>BBDD Puntos de recarga </a:t>
+              <a:t>Puntos de recarga </a:t>
             </a:r>
             <a:r>
               <a:rPr lang="es-ES" dirty="0">
@@ -5370,6 +5304,114 @@
           <a:xfrm>
             <a:off x="10800522" y="3944962"/>
             <a:ext cx="1258956" cy="0"/>
+          </a:xfrm>
+          <a:prstGeom prst="straightConnector1">
+            <a:avLst/>
+          </a:prstGeom>
+          <a:ln w="38100">
+            <a:tailEnd type="triangle"/>
+          </a:ln>
+        </p:spPr>
+        <p:style>
+          <a:lnRef idx="1">
+            <a:schemeClr val="dk1"/>
+          </a:lnRef>
+          <a:fillRef idx="0">
+            <a:schemeClr val="dk1"/>
+          </a:fillRef>
+          <a:effectRef idx="0">
+            <a:schemeClr val="dk1"/>
+          </a:effectRef>
+          <a:fontRef idx="minor">
+            <a:schemeClr val="tx1"/>
+          </a:fontRef>
+        </p:style>
+      </p:cxnSp>
+      <p:sp>
+        <p:nvSpPr>
+          <p:cNvPr id="19" name="CuadroTexto 18">
+            <a:extLst>
+              <a:ext uri="{FF2B5EF4-FFF2-40B4-BE49-F238E27FC236}">
+                <a16:creationId xmlns:a16="http://schemas.microsoft.com/office/drawing/2014/main" id="{654D80CF-744A-4F3A-862E-1C6364150E61}"/>
+              </a:ext>
+            </a:extLst>
+          </p:cNvPr>
+          <p:cNvSpPr txBox="1"/>
+          <p:nvPr/>
+        </p:nvSpPr>
+        <p:spPr>
+          <a:xfrm>
+            <a:off x="94775" y="4719493"/>
+            <a:ext cx="6107184" cy="923330"/>
+          </a:xfrm>
+          <a:prstGeom prst="rect">
+            <a:avLst/>
+          </a:prstGeom>
+          <a:noFill/>
+        </p:spPr>
+        <p:txBody>
+          <a:bodyPr wrap="square">
+            <a:spAutoFit/>
+          </a:bodyPr>
+          <a:lstStyle/>
+          <a:p>
+            <a:r>
+              <a:rPr lang="es-ES" dirty="0">
+                <a:latin typeface="LM Roman 10" panose="00000500000000000000" pitchFamily="50" charset="0"/>
+              </a:rPr>
+              <a:t>Datos de API:</a:t>
+            </a:r>
+          </a:p>
+          <a:p>
+            <a:pPr marL="285750" indent="-285750">
+              <a:buFontTx/>
+              <a:buChar char="-"/>
+            </a:pPr>
+            <a:r>
+              <a:rPr lang="es-ES" dirty="0">
+                <a:latin typeface="LM Roman 10" panose="00000500000000000000" pitchFamily="50" charset="0"/>
+              </a:rPr>
+              <a:t>Red de carreteras</a:t>
+            </a:r>
+          </a:p>
+          <a:p>
+            <a:pPr marL="285750" indent="-285750">
+              <a:buFontTx/>
+              <a:buChar char="-"/>
+            </a:pPr>
+            <a:r>
+              <a:rPr lang="es-ES" dirty="0">
+                <a:solidFill>
+                  <a:srgbClr val="00B0F0"/>
+                </a:solidFill>
+                <a:latin typeface="LM Roman 10" panose="00000500000000000000" pitchFamily="50" charset="0"/>
+              </a:rPr>
+              <a:t>Volumen de tráfico</a:t>
+            </a:r>
+            <a:endParaRPr lang="es-ES" dirty="0">
+              <a:latin typeface="LM Roman 10" panose="00000500000000000000" pitchFamily="50" charset="0"/>
+            </a:endParaRPr>
+          </a:p>
+        </p:txBody>
+      </p:sp>
+      <p:cxnSp>
+        <p:nvCxnSpPr>
+          <p:cNvPr id="20" name="Conector recto de flecha 19">
+            <a:extLst>
+              <a:ext uri="{FF2B5EF4-FFF2-40B4-BE49-F238E27FC236}">
+                <a16:creationId xmlns:a16="http://schemas.microsoft.com/office/drawing/2014/main" id="{2F158AAB-572D-4AB5-BF80-456D94966595}"/>
+              </a:ext>
+            </a:extLst>
+          </p:cNvPr>
+          <p:cNvCxnSpPr>
+            <a:cxnSpLocks/>
+          </p:cNvCxnSpPr>
+          <p:nvPr/>
+        </p:nvCxnSpPr>
+        <p:spPr>
+          <a:xfrm flipV="1">
+            <a:off x="373891" y="5648844"/>
+            <a:ext cx="2070770" cy="653"/>
           </a:xfrm>
           <a:prstGeom prst="straightConnector1">
             <a:avLst/>
@@ -5737,8 +5779,8 @@
         </p:nvSpPr>
         <p:spPr>
           <a:xfrm>
-            <a:off x="6142036" y="2231459"/>
-            <a:ext cx="2788007" cy="369332"/>
+            <a:off x="4950798" y="2231459"/>
+            <a:ext cx="5298374" cy="369332"/>
           </a:xfrm>
           <a:prstGeom prst="rect">
             <a:avLst/>
@@ -5755,7 +5797,7 @@
               <a:rPr lang="es-ES" dirty="0">
                 <a:latin typeface="LM Roman 10" panose="00000500000000000000" pitchFamily="50" charset="0"/>
               </a:rPr>
-              <a:t>Modelo optimización ruta</a:t>
+              <a:t>Modelo optimización ruta -&gt; Problema del viajero</a:t>
             </a:r>
           </a:p>
         </p:txBody>

</xml_diff>

<commit_message>
[MODELO] Actualizado PPT diseño funcional y modelo
</commit_message>
<xml_diff>
--- a/Documentacion/Diseño funcional y modelos.pptx
+++ b/Documentacion/Diseño funcional y modelos.pptx
@@ -265,7 +265,7 @@
           <a:p>
             <a:fld id="{33C8F781-4471-4207-AA15-D02BAF5FD67C}" type="datetimeFigureOut">
               <a:rPr lang="es-ES" smtClean="0"/>
-              <a:t>18/12/2020</a:t>
+              <a:t>03/01/2021</a:t>
             </a:fld>
             <a:endParaRPr lang="es-ES"/>
           </a:p>
@@ -463,7 +463,7 @@
           <a:p>
             <a:fld id="{33C8F781-4471-4207-AA15-D02BAF5FD67C}" type="datetimeFigureOut">
               <a:rPr lang="es-ES" smtClean="0"/>
-              <a:t>18/12/2020</a:t>
+              <a:t>03/01/2021</a:t>
             </a:fld>
             <a:endParaRPr lang="es-ES"/>
           </a:p>
@@ -671,7 +671,7 @@
           <a:p>
             <a:fld id="{33C8F781-4471-4207-AA15-D02BAF5FD67C}" type="datetimeFigureOut">
               <a:rPr lang="es-ES" smtClean="0"/>
-              <a:t>18/12/2020</a:t>
+              <a:t>03/01/2021</a:t>
             </a:fld>
             <a:endParaRPr lang="es-ES"/>
           </a:p>
@@ -869,7 +869,7 @@
           <a:p>
             <a:fld id="{33C8F781-4471-4207-AA15-D02BAF5FD67C}" type="datetimeFigureOut">
               <a:rPr lang="es-ES" smtClean="0"/>
-              <a:t>18/12/2020</a:t>
+              <a:t>03/01/2021</a:t>
             </a:fld>
             <a:endParaRPr lang="es-ES"/>
           </a:p>
@@ -1144,7 +1144,7 @@
           <a:p>
             <a:fld id="{33C8F781-4471-4207-AA15-D02BAF5FD67C}" type="datetimeFigureOut">
               <a:rPr lang="es-ES" smtClean="0"/>
-              <a:t>18/12/2020</a:t>
+              <a:t>03/01/2021</a:t>
             </a:fld>
             <a:endParaRPr lang="es-ES"/>
           </a:p>
@@ -1409,7 +1409,7 @@
           <a:p>
             <a:fld id="{33C8F781-4471-4207-AA15-D02BAF5FD67C}" type="datetimeFigureOut">
               <a:rPr lang="es-ES" smtClean="0"/>
-              <a:t>18/12/2020</a:t>
+              <a:t>03/01/2021</a:t>
             </a:fld>
             <a:endParaRPr lang="es-ES"/>
           </a:p>
@@ -1821,7 +1821,7 @@
           <a:p>
             <a:fld id="{33C8F781-4471-4207-AA15-D02BAF5FD67C}" type="datetimeFigureOut">
               <a:rPr lang="es-ES" smtClean="0"/>
-              <a:t>18/12/2020</a:t>
+              <a:t>03/01/2021</a:t>
             </a:fld>
             <a:endParaRPr lang="es-ES"/>
           </a:p>
@@ -1962,7 +1962,7 @@
           <a:p>
             <a:fld id="{33C8F781-4471-4207-AA15-D02BAF5FD67C}" type="datetimeFigureOut">
               <a:rPr lang="es-ES" smtClean="0"/>
-              <a:t>18/12/2020</a:t>
+              <a:t>03/01/2021</a:t>
             </a:fld>
             <a:endParaRPr lang="es-ES"/>
           </a:p>
@@ -2075,7 +2075,7 @@
           <a:p>
             <a:fld id="{33C8F781-4471-4207-AA15-D02BAF5FD67C}" type="datetimeFigureOut">
               <a:rPr lang="es-ES" smtClean="0"/>
-              <a:t>18/12/2020</a:t>
+              <a:t>03/01/2021</a:t>
             </a:fld>
             <a:endParaRPr lang="es-ES"/>
           </a:p>
@@ -2386,7 +2386,7 @@
           <a:p>
             <a:fld id="{33C8F781-4471-4207-AA15-D02BAF5FD67C}" type="datetimeFigureOut">
               <a:rPr lang="es-ES" smtClean="0"/>
-              <a:t>18/12/2020</a:t>
+              <a:t>03/01/2021</a:t>
             </a:fld>
             <a:endParaRPr lang="es-ES"/>
           </a:p>
@@ -2674,7 +2674,7 @@
           <a:p>
             <a:fld id="{33C8F781-4471-4207-AA15-D02BAF5FD67C}" type="datetimeFigureOut">
               <a:rPr lang="es-ES" smtClean="0"/>
-              <a:t>18/12/2020</a:t>
+              <a:t>03/01/2021</a:t>
             </a:fld>
             <a:endParaRPr lang="es-ES"/>
           </a:p>
@@ -2915,7 +2915,7 @@
           <a:p>
             <a:fld id="{33C8F781-4471-4207-AA15-D02BAF5FD67C}" type="datetimeFigureOut">
               <a:rPr lang="es-ES" smtClean="0"/>
-              <a:t>18/12/2020</a:t>
+              <a:t>03/01/2021</a:t>
             </a:fld>
             <a:endParaRPr lang="es-ES"/>
           </a:p>
@@ -4595,7 +4595,7 @@
         </p:nvCxnSpPr>
         <p:spPr>
           <a:xfrm>
-            <a:off x="380882" y="2516520"/>
+            <a:off x="380882" y="4179862"/>
             <a:ext cx="2070770" cy="0"/>
           </a:xfrm>
           <a:prstGeom prst="straightConnector1">
@@ -4634,8 +4634,8 @@
         </p:nvSpPr>
         <p:spPr>
           <a:xfrm>
-            <a:off x="47513" y="1007166"/>
-            <a:ext cx="2570925" cy="1754326"/>
+            <a:off x="152019" y="3227864"/>
+            <a:ext cx="2570925" cy="923330"/>
           </a:xfrm>
           <a:prstGeom prst="rect">
             <a:avLst/>
@@ -4679,148 +4679,6 @@
               <a:t>Modelo del coche</a:t>
             </a:r>
           </a:p>
-          <a:p>
-            <a:pPr marL="285750" indent="-285750">
-              <a:buFontTx/>
-              <a:buChar char="-"/>
-            </a:pPr>
-            <a:r>
-              <a:rPr lang="es-ES" dirty="0">
-                <a:solidFill>
-                  <a:srgbClr val="00B0F0"/>
-                </a:solidFill>
-                <a:latin typeface="LM Roman 10" panose="00000500000000000000" pitchFamily="50" charset="0"/>
-              </a:rPr>
-              <a:t>Número de paradas</a:t>
-            </a:r>
-          </a:p>
-          <a:p>
-            <a:pPr marL="285750" indent="-285750">
-              <a:buFontTx/>
-              <a:buChar char="-"/>
-            </a:pPr>
-            <a:r>
-              <a:rPr lang="es-ES" dirty="0">
-                <a:solidFill>
-                  <a:srgbClr val="00B0F0"/>
-                </a:solidFill>
-                <a:latin typeface="LM Roman 10" panose="00000500000000000000" pitchFamily="50" charset="0"/>
-              </a:rPr>
-              <a:t>Tipo de carretera</a:t>
-            </a:r>
-          </a:p>
-          <a:p>
-            <a:endParaRPr lang="es-ES" dirty="0">
-              <a:latin typeface="LM Roman 10" panose="00000500000000000000" pitchFamily="50" charset="0"/>
-            </a:endParaRPr>
-          </a:p>
-        </p:txBody>
-      </p:sp>
-      <p:cxnSp>
-        <p:nvCxnSpPr>
-          <p:cNvPr id="6" name="Conector recto de flecha 5">
-            <a:extLst>
-              <a:ext uri="{FF2B5EF4-FFF2-40B4-BE49-F238E27FC236}">
-                <a16:creationId xmlns:a16="http://schemas.microsoft.com/office/drawing/2014/main" id="{3200878F-4669-4C39-8A37-828A326F5B46}"/>
-              </a:ext>
-            </a:extLst>
-          </p:cNvPr>
-          <p:cNvCxnSpPr>
-            <a:cxnSpLocks/>
-          </p:cNvCxnSpPr>
-          <p:nvPr/>
-        </p:nvCxnSpPr>
-        <p:spPr>
-          <a:xfrm flipV="1">
-            <a:off x="380882" y="4137426"/>
-            <a:ext cx="2070770" cy="653"/>
-          </a:xfrm>
-          <a:prstGeom prst="straightConnector1">
-            <a:avLst/>
-          </a:prstGeom>
-          <a:ln w="38100">
-            <a:tailEnd type="triangle"/>
-          </a:ln>
-        </p:spPr>
-        <p:style>
-          <a:lnRef idx="1">
-            <a:schemeClr val="dk1"/>
-          </a:lnRef>
-          <a:fillRef idx="0">
-            <a:schemeClr val="dk1"/>
-          </a:fillRef>
-          <a:effectRef idx="0">
-            <a:schemeClr val="dk1"/>
-          </a:effectRef>
-          <a:fontRef idx="minor">
-            <a:schemeClr val="tx1"/>
-          </a:fontRef>
-        </p:style>
-      </p:cxnSp>
-      <p:sp>
-        <p:nvSpPr>
-          <p:cNvPr id="8" name="CuadroTexto 7">
-            <a:extLst>
-              <a:ext uri="{FF2B5EF4-FFF2-40B4-BE49-F238E27FC236}">
-                <a16:creationId xmlns:a16="http://schemas.microsoft.com/office/drawing/2014/main" id="{4180A893-DDAD-4B9A-8CA4-01EB77F7B7F3}"/>
-              </a:ext>
-            </a:extLst>
-          </p:cNvPr>
-          <p:cNvSpPr txBox="1"/>
-          <p:nvPr/>
-        </p:nvSpPr>
-        <p:spPr>
-          <a:xfrm>
-            <a:off x="145109" y="2870468"/>
-            <a:ext cx="2328952" cy="1477328"/>
-          </a:xfrm>
-          <a:prstGeom prst="rect">
-            <a:avLst/>
-          </a:prstGeom>
-          <a:noFill/>
-        </p:spPr>
-        <p:txBody>
-          <a:bodyPr wrap="square" rtlCol="0">
-            <a:spAutoFit/>
-          </a:bodyPr>
-          <a:lstStyle/>
-          <a:p>
-            <a:r>
-              <a:rPr lang="es-ES" dirty="0">
-                <a:latin typeface="LM Roman 10" panose="00000500000000000000" pitchFamily="50" charset="0"/>
-              </a:rPr>
-              <a:t>Datos de los CSV:</a:t>
-            </a:r>
-          </a:p>
-          <a:p>
-            <a:pPr marL="285750" indent="-285750">
-              <a:buFontTx/>
-              <a:buChar char="-"/>
-            </a:pPr>
-            <a:r>
-              <a:rPr lang="es-ES" dirty="0">
-                <a:latin typeface="LM Roman 10" panose="00000500000000000000" pitchFamily="50" charset="0"/>
-              </a:rPr>
-              <a:t>Coches eléctricos </a:t>
-            </a:r>
-          </a:p>
-          <a:p>
-            <a:pPr marL="285750" indent="-285750">
-              <a:buFontTx/>
-              <a:buChar char="-"/>
-            </a:pPr>
-            <a:r>
-              <a:rPr lang="es-ES" dirty="0">
-                <a:latin typeface="LM Roman 10" panose="00000500000000000000" pitchFamily="50" charset="0"/>
-              </a:rPr>
-              <a:t>Puntos de recarga (latitud, longitud)</a:t>
-            </a:r>
-          </a:p>
-          <a:p>
-            <a:endParaRPr lang="es-ES" dirty="0">
-              <a:latin typeface="LM Roman 10" panose="00000500000000000000" pitchFamily="50" charset="0"/>
-            </a:endParaRPr>
-          </a:p>
         </p:txBody>
       </p:sp>
       <p:sp>
@@ -4837,8 +4695,8 @@
         </p:nvSpPr>
         <p:spPr>
           <a:xfrm>
-            <a:off x="2640380" y="1639357"/>
-            <a:ext cx="2697051" cy="1580921"/>
+            <a:off x="2930692" y="1492676"/>
+            <a:ext cx="7557572" cy="1163434"/>
           </a:xfrm>
           <a:prstGeom prst="rect">
             <a:avLst/>
@@ -4889,7 +4747,7 @@
         </p:nvSpPr>
         <p:spPr>
           <a:xfrm>
-            <a:off x="2709836" y="1709992"/>
+            <a:off x="5360950" y="1461393"/>
             <a:ext cx="2697051" cy="1477328"/>
           </a:xfrm>
           <a:prstGeom prst="rect">
@@ -4965,10 +4823,10 @@
       </p:sp>
       <p:sp>
         <p:nvSpPr>
-          <p:cNvPr id="12" name="Rectángulo 11">
-            <a:extLst>
-              <a:ext uri="{FF2B5EF4-FFF2-40B4-BE49-F238E27FC236}">
-                <a16:creationId xmlns:a16="http://schemas.microsoft.com/office/drawing/2014/main" id="{FEFD7840-45FF-4406-AF1F-39F7821CE4F8}"/>
+          <p:cNvPr id="13" name="Rectángulo 12">
+            <a:extLst>
+              <a:ext uri="{FF2B5EF4-FFF2-40B4-BE49-F238E27FC236}">
+                <a16:creationId xmlns:a16="http://schemas.microsoft.com/office/drawing/2014/main" id="{1A70B054-A8E7-4B33-872B-FD26857F6DE4}"/>
               </a:ext>
             </a:extLst>
           </p:cNvPr>
@@ -4977,8 +4835,8 @@
         </p:nvSpPr>
         <p:spPr>
           <a:xfrm>
-            <a:off x="5428829" y="3126573"/>
-            <a:ext cx="2416925" cy="1561043"/>
+            <a:off x="2930693" y="2744576"/>
+            <a:ext cx="7557571" cy="1051573"/>
           </a:xfrm>
           <a:prstGeom prst="rect">
             <a:avLst/>
@@ -5017,10 +4875,158 @@
       </p:sp>
       <p:sp>
         <p:nvSpPr>
-          <p:cNvPr id="13" name="Rectángulo 12">
-            <a:extLst>
-              <a:ext uri="{FF2B5EF4-FFF2-40B4-BE49-F238E27FC236}">
-                <a16:creationId xmlns:a16="http://schemas.microsoft.com/office/drawing/2014/main" id="{1A70B054-A8E7-4B33-872B-FD26857F6DE4}"/>
+          <p:cNvPr id="15" name="CuadroTexto 14">
+            <a:extLst>
+              <a:ext uri="{FF2B5EF4-FFF2-40B4-BE49-F238E27FC236}">
+                <a16:creationId xmlns:a16="http://schemas.microsoft.com/office/drawing/2014/main" id="{D34329C7-800D-44FD-94FE-057092D4EA10}"/>
+              </a:ext>
+            </a:extLst>
+          </p:cNvPr>
+          <p:cNvSpPr txBox="1"/>
+          <p:nvPr/>
+        </p:nvSpPr>
+        <p:spPr>
+          <a:xfrm>
+            <a:off x="4804256" y="2824500"/>
+            <a:ext cx="4457051" cy="923330"/>
+          </a:xfrm>
+          <a:prstGeom prst="rect">
+            <a:avLst/>
+          </a:prstGeom>
+          <a:noFill/>
+        </p:spPr>
+        <p:txBody>
+          <a:bodyPr wrap="square" rtlCol="0">
+            <a:spAutoFit/>
+          </a:bodyPr>
+          <a:lstStyle/>
+          <a:p>
+            <a:r>
+              <a:rPr lang="es-ES" b="1" i="1" dirty="0">
+                <a:latin typeface="LM Roman 10" panose="00000500000000000000" pitchFamily="50" charset="0"/>
+              </a:rPr>
+              <a:t>Puntos de recarga (GMAPI) </a:t>
+            </a:r>
+          </a:p>
+          <a:p>
+            <a:r>
+              <a:rPr lang="es-ES" b="1" i="1" dirty="0">
+                <a:latin typeface="LM Roman 10" panose="00000500000000000000" pitchFamily="50" charset="0"/>
+              </a:rPr>
+              <a:t>- </a:t>
+            </a:r>
+            <a:r>
+              <a:rPr lang="es-ES" dirty="0">
+                <a:latin typeface="LM Roman 10" panose="00000500000000000000" pitchFamily="50" charset="0"/>
+              </a:rPr>
+              <a:t>Nombre, dirección, coordenadas</a:t>
+            </a:r>
+          </a:p>
+          <a:p>
+            <a:endParaRPr lang="es-ES" dirty="0">
+              <a:latin typeface="LM Roman 10" panose="00000500000000000000" pitchFamily="50" charset="0"/>
+            </a:endParaRPr>
+          </a:p>
+        </p:txBody>
+      </p:sp>
+      <p:cxnSp>
+        <p:nvCxnSpPr>
+          <p:cNvPr id="24" name="Conector recto de flecha 23">
+            <a:extLst>
+              <a:ext uri="{FF2B5EF4-FFF2-40B4-BE49-F238E27FC236}">
+                <a16:creationId xmlns:a16="http://schemas.microsoft.com/office/drawing/2014/main" id="{E2D56C3C-C4A5-4480-80FE-3BDC16684003}"/>
+              </a:ext>
+            </a:extLst>
+          </p:cNvPr>
+          <p:cNvCxnSpPr>
+            <a:cxnSpLocks/>
+          </p:cNvCxnSpPr>
+          <p:nvPr/>
+        </p:nvCxnSpPr>
+        <p:spPr>
+          <a:xfrm>
+            <a:off x="10800522" y="3944962"/>
+            <a:ext cx="1258956" cy="0"/>
+          </a:xfrm>
+          <a:prstGeom prst="straightConnector1">
+            <a:avLst/>
+          </a:prstGeom>
+          <a:ln w="38100">
+            <a:tailEnd type="triangle"/>
+          </a:ln>
+        </p:spPr>
+        <p:style>
+          <a:lnRef idx="1">
+            <a:schemeClr val="dk1"/>
+          </a:lnRef>
+          <a:fillRef idx="0">
+            <a:schemeClr val="dk1"/>
+          </a:fillRef>
+          <a:effectRef idx="0">
+            <a:schemeClr val="dk1"/>
+          </a:effectRef>
+          <a:fontRef idx="minor">
+            <a:schemeClr val="tx1"/>
+          </a:fontRef>
+        </p:style>
+      </p:cxnSp>
+      <p:sp>
+        <p:nvSpPr>
+          <p:cNvPr id="21" name="CuadroTexto 20">
+            <a:extLst>
+              <a:ext uri="{FF2B5EF4-FFF2-40B4-BE49-F238E27FC236}">
+                <a16:creationId xmlns:a16="http://schemas.microsoft.com/office/drawing/2014/main" id="{8FEA196E-BCB3-485B-8A5B-AD791CF39639}"/>
+              </a:ext>
+            </a:extLst>
+          </p:cNvPr>
+          <p:cNvSpPr txBox="1"/>
+          <p:nvPr/>
+        </p:nvSpPr>
+        <p:spPr>
+          <a:xfrm>
+            <a:off x="4804256" y="3894454"/>
+            <a:ext cx="4670670" cy="923330"/>
+          </a:xfrm>
+          <a:prstGeom prst="rect">
+            <a:avLst/>
+          </a:prstGeom>
+          <a:noFill/>
+        </p:spPr>
+        <p:txBody>
+          <a:bodyPr wrap="square" rtlCol="0">
+            <a:spAutoFit/>
+          </a:bodyPr>
+          <a:lstStyle/>
+          <a:p>
+            <a:r>
+              <a:rPr lang="es-ES" b="1" i="1" dirty="0">
+                <a:latin typeface="LM Roman 10" panose="00000500000000000000" pitchFamily="50" charset="0"/>
+              </a:rPr>
+              <a:t>Opciones Origen/Destino (desplegable) (GMAPI) </a:t>
+            </a:r>
+          </a:p>
+          <a:p>
+            <a:r>
+              <a:rPr lang="es-ES" b="1" i="1" dirty="0">
+                <a:latin typeface="LM Roman 10" panose="00000500000000000000" pitchFamily="50" charset="0"/>
+              </a:rPr>
+              <a:t>- </a:t>
+            </a:r>
+            <a:r>
+              <a:rPr lang="es-ES" dirty="0">
+                <a:latin typeface="LM Roman 10" panose="00000500000000000000" pitchFamily="50" charset="0"/>
+              </a:rPr>
+              <a:t>Nombre, dirección, coordenadas</a:t>
+            </a:r>
+          </a:p>
+        </p:txBody>
+      </p:sp>
+      <p:sp>
+        <p:nvSpPr>
+          <p:cNvPr id="22" name="Rectángulo 21">
+            <a:extLst>
+              <a:ext uri="{FF2B5EF4-FFF2-40B4-BE49-F238E27FC236}">
+                <a16:creationId xmlns:a16="http://schemas.microsoft.com/office/drawing/2014/main" id="{B568EC4A-9C31-4D1B-81E0-9BBBF41E5EB6}"/>
               </a:ext>
             </a:extLst>
           </p:cNvPr>
@@ -5029,8 +5035,8 @@
         </p:nvSpPr>
         <p:spPr>
           <a:xfrm>
-            <a:off x="7945362" y="4644860"/>
-            <a:ext cx="2697051" cy="1580921"/>
+            <a:off x="2930693" y="3894692"/>
+            <a:ext cx="7557572" cy="1021394"/>
           </a:xfrm>
           <a:prstGeom prst="rect">
             <a:avLst/>
@@ -5038,7 +5044,7 @@
           <a:noFill/>
           <a:ln w="38100">
             <a:solidFill>
-              <a:schemeClr val="tx1"/>
+              <a:srgbClr val="FF0000"/>
             </a:solidFill>
           </a:ln>
         </p:spPr>
@@ -5063,276 +5069,82 @@
           <a:lstStyle/>
           <a:p>
             <a:pPr algn="ctr"/>
-            <a:endParaRPr lang="es-ES"/>
-          </a:p>
-        </p:txBody>
-      </p:sp>
-      <p:sp>
-        <p:nvSpPr>
-          <p:cNvPr id="14" name="CuadroTexto 13">
-            <a:extLst>
-              <a:ext uri="{FF2B5EF4-FFF2-40B4-BE49-F238E27FC236}">
-                <a16:creationId xmlns:a16="http://schemas.microsoft.com/office/drawing/2014/main" id="{BAAF61F9-DB3E-491A-9FBB-D62846EFB100}"/>
-              </a:ext>
-            </a:extLst>
-          </p:cNvPr>
-          <p:cNvSpPr txBox="1"/>
+            <a:endParaRPr lang="es-ES" dirty="0">
+              <a:solidFill>
+                <a:srgbClr val="FF0000"/>
+              </a:solidFill>
+              <a:highlight>
+                <a:srgbClr val="FF0000"/>
+              </a:highlight>
+            </a:endParaRPr>
+          </a:p>
+        </p:txBody>
+      </p:sp>
+      <p:sp>
+        <p:nvSpPr>
+          <p:cNvPr id="14" name="Rectángulo 13">
+            <a:extLst>
+              <a:ext uri="{FF2B5EF4-FFF2-40B4-BE49-F238E27FC236}">
+                <a16:creationId xmlns:a16="http://schemas.microsoft.com/office/drawing/2014/main" id="{4E9CA07D-7A6B-4EAB-B0B9-1BD325015D4F}"/>
+              </a:ext>
+            </a:extLst>
+          </p:cNvPr>
+          <p:cNvSpPr/>
           <p:nvPr/>
         </p:nvSpPr>
         <p:spPr>
           <a:xfrm>
-            <a:off x="5441615" y="3126573"/>
-            <a:ext cx="2269787" cy="1200329"/>
+            <a:off x="2930689" y="5046516"/>
+            <a:ext cx="7557572" cy="1200090"/>
           </a:xfrm>
           <a:prstGeom prst="rect">
             <a:avLst/>
           </a:prstGeom>
           <a:noFill/>
-        </p:spPr>
-        <p:txBody>
-          <a:bodyPr wrap="square" rtlCol="0">
-            <a:spAutoFit/>
-          </a:bodyPr>
-          <a:lstStyle/>
-          <a:p>
-            <a:r>
-              <a:rPr lang="es-ES" b="1" i="1" dirty="0">
-                <a:latin typeface="LM Roman 10" panose="00000500000000000000" pitchFamily="50" charset="0"/>
-              </a:rPr>
-              <a:t>Red de carreteras  </a:t>
-            </a:r>
-            <a:r>
-              <a:rPr lang="es-ES" dirty="0">
-                <a:latin typeface="LM Roman 10" panose="00000500000000000000" pitchFamily="50" charset="0"/>
-              </a:rPr>
-              <a:t>para obtener:</a:t>
-            </a:r>
-          </a:p>
-          <a:p>
-            <a:pPr marL="285750" indent="-285750">
-              <a:buFontTx/>
-              <a:buChar char="-"/>
-            </a:pPr>
-            <a:r>
-              <a:rPr lang="es-ES" dirty="0">
-                <a:latin typeface="LM Roman 10" panose="00000500000000000000" pitchFamily="50" charset="0"/>
-              </a:rPr>
-              <a:t>Rutas posibles</a:t>
-            </a:r>
-          </a:p>
-          <a:p>
-            <a:pPr marL="285750" indent="-285750">
-              <a:buFontTx/>
-              <a:buChar char="-"/>
-            </a:pPr>
-            <a:endParaRPr lang="es-ES" dirty="0">
-              <a:latin typeface="LM Roman 10" panose="00000500000000000000" pitchFamily="50" charset="0"/>
-            </a:endParaRPr>
-          </a:p>
-        </p:txBody>
-      </p:sp>
-      <p:sp>
-        <p:nvSpPr>
-          <p:cNvPr id="15" name="CuadroTexto 14">
-            <a:extLst>
-              <a:ext uri="{FF2B5EF4-FFF2-40B4-BE49-F238E27FC236}">
-                <a16:creationId xmlns:a16="http://schemas.microsoft.com/office/drawing/2014/main" id="{D34329C7-800D-44FD-94FE-057092D4EA10}"/>
-              </a:ext>
-            </a:extLst>
-          </p:cNvPr>
-          <p:cNvSpPr txBox="1"/>
-          <p:nvPr/>
-        </p:nvSpPr>
-        <p:spPr>
-          <a:xfrm>
-            <a:off x="8069658" y="4660248"/>
-            <a:ext cx="2448457" cy="1477328"/>
-          </a:xfrm>
-          <a:prstGeom prst="rect">
-            <a:avLst/>
-          </a:prstGeom>
-          <a:noFill/>
-        </p:spPr>
-        <p:txBody>
-          <a:bodyPr wrap="square" rtlCol="0">
-            <a:spAutoFit/>
-          </a:bodyPr>
-          <a:lstStyle/>
-          <a:p>
-            <a:r>
-              <a:rPr lang="es-ES" b="1" i="1" dirty="0">
-                <a:latin typeface="LM Roman 10" panose="00000500000000000000" pitchFamily="50" charset="0"/>
-              </a:rPr>
-              <a:t>Puntos de recarga </a:t>
-            </a:r>
-            <a:r>
-              <a:rPr lang="es-ES" dirty="0">
-                <a:latin typeface="LM Roman 10" panose="00000500000000000000" pitchFamily="50" charset="0"/>
-              </a:rPr>
-              <a:t>para obtener:</a:t>
-            </a:r>
-          </a:p>
-          <a:p>
-            <a:pPr marL="285750" indent="-285750">
-              <a:buFontTx/>
-              <a:buChar char="-"/>
-            </a:pPr>
-            <a:r>
-              <a:rPr lang="es-ES" dirty="0">
-                <a:latin typeface="LM Roman 10" panose="00000500000000000000" pitchFamily="50" charset="0"/>
-              </a:rPr>
-              <a:t>Puntos a lo largo de las rutas</a:t>
-            </a:r>
-          </a:p>
-          <a:p>
-            <a:pPr marL="285750" indent="-285750">
-              <a:buFontTx/>
-              <a:buChar char="-"/>
-            </a:pPr>
-            <a:endParaRPr lang="es-ES" dirty="0">
-              <a:latin typeface="LM Roman 10" panose="00000500000000000000" pitchFamily="50" charset="0"/>
-            </a:endParaRPr>
-          </a:p>
-        </p:txBody>
-      </p:sp>
-      <p:cxnSp>
-        <p:nvCxnSpPr>
-          <p:cNvPr id="17" name="Conector: angular 16">
-            <a:extLst>
-              <a:ext uri="{FF2B5EF4-FFF2-40B4-BE49-F238E27FC236}">
-                <a16:creationId xmlns:a16="http://schemas.microsoft.com/office/drawing/2014/main" id="{6F65442A-BD0E-4E7C-AE27-991D5B1CF834}"/>
-              </a:ext>
-            </a:extLst>
-          </p:cNvPr>
-          <p:cNvCxnSpPr>
-            <a:cxnSpLocks/>
-            <a:endCxn id="14" idx="0"/>
-          </p:cNvCxnSpPr>
-          <p:nvPr/>
-        </p:nvCxnSpPr>
-        <p:spPr>
-          <a:xfrm>
-            <a:off x="5359373" y="2319130"/>
-            <a:ext cx="1217136" cy="807443"/>
-          </a:xfrm>
-          <a:prstGeom prst="bentConnector2">
-            <a:avLst/>
-          </a:prstGeom>
           <a:ln w="38100">
             <a:solidFill>
-              <a:schemeClr val="tx1"/>
+              <a:srgbClr val="FF0000"/>
             </a:solidFill>
-            <a:tailEnd type="triangle"/>
           </a:ln>
         </p:spPr>
         <p:style>
-          <a:lnRef idx="1">
-            <a:schemeClr val="accent1"/>
+          <a:lnRef idx="2">
+            <a:schemeClr val="accent1">
+              <a:shade val="50000"/>
+            </a:schemeClr>
           </a:lnRef>
-          <a:fillRef idx="0">
+          <a:fillRef idx="1">
             <a:schemeClr val="accent1"/>
           </a:fillRef>
           <a:effectRef idx="0">
             <a:schemeClr val="accent1"/>
           </a:effectRef>
           <a:fontRef idx="minor">
-            <a:schemeClr val="tx1"/>
+            <a:schemeClr val="lt1"/>
           </a:fontRef>
         </p:style>
-      </p:cxnSp>
-      <p:cxnSp>
-        <p:nvCxnSpPr>
-          <p:cNvPr id="18" name="Conector: angular 17">
-            <a:extLst>
-              <a:ext uri="{FF2B5EF4-FFF2-40B4-BE49-F238E27FC236}">
-                <a16:creationId xmlns:a16="http://schemas.microsoft.com/office/drawing/2014/main" id="{47679E21-B8BA-46B0-83BD-4CCA1BEFFDC5}"/>
-              </a:ext>
-            </a:extLst>
-          </p:cNvPr>
-          <p:cNvCxnSpPr>
-            <a:cxnSpLocks/>
-            <a:stCxn id="12" idx="3"/>
-            <a:endCxn id="13" idx="0"/>
-          </p:cNvCxnSpPr>
-          <p:nvPr/>
-        </p:nvCxnSpPr>
-        <p:spPr>
-          <a:xfrm>
-            <a:off x="7845754" y="3907095"/>
-            <a:ext cx="1448134" cy="737765"/>
-          </a:xfrm>
-          <a:prstGeom prst="bentConnector2">
-            <a:avLst/>
-          </a:prstGeom>
-          <a:ln w="38100">
-            <a:solidFill>
-              <a:schemeClr val="tx1"/>
-            </a:solidFill>
-            <a:tailEnd type="triangle"/>
-          </a:ln>
-        </p:spPr>
-        <p:style>
-          <a:lnRef idx="1">
-            <a:schemeClr val="accent1"/>
-          </a:lnRef>
-          <a:fillRef idx="0">
-            <a:schemeClr val="accent1"/>
-          </a:fillRef>
-          <a:effectRef idx="0">
-            <a:schemeClr val="accent1"/>
-          </a:effectRef>
-          <a:fontRef idx="minor">
-            <a:schemeClr val="tx1"/>
-          </a:fontRef>
-        </p:style>
-      </p:cxnSp>
-      <p:cxnSp>
-        <p:nvCxnSpPr>
-          <p:cNvPr id="24" name="Conector recto de flecha 23">
-            <a:extLst>
-              <a:ext uri="{FF2B5EF4-FFF2-40B4-BE49-F238E27FC236}">
-                <a16:creationId xmlns:a16="http://schemas.microsoft.com/office/drawing/2014/main" id="{E2D56C3C-C4A5-4480-80FE-3BDC16684003}"/>
-              </a:ext>
-            </a:extLst>
-          </p:cNvPr>
-          <p:cNvCxnSpPr>
-            <a:cxnSpLocks/>
-          </p:cNvCxnSpPr>
-          <p:nvPr/>
-        </p:nvCxnSpPr>
-        <p:spPr>
-          <a:xfrm>
-            <a:off x="10800522" y="3944962"/>
-            <a:ext cx="1258956" cy="0"/>
-          </a:xfrm>
-          <a:prstGeom prst="straightConnector1">
-            <a:avLst/>
-          </a:prstGeom>
-          <a:ln w="38100">
-            <a:tailEnd type="triangle"/>
-          </a:ln>
-        </p:spPr>
-        <p:style>
-          <a:lnRef idx="1">
-            <a:schemeClr val="dk1"/>
-          </a:lnRef>
-          <a:fillRef idx="0">
-            <a:schemeClr val="dk1"/>
-          </a:fillRef>
-          <a:effectRef idx="0">
-            <a:schemeClr val="dk1"/>
-          </a:effectRef>
-          <a:fontRef idx="minor">
-            <a:schemeClr val="tx1"/>
-          </a:fontRef>
-        </p:style>
-      </p:cxnSp>
-      <p:sp>
-        <p:nvSpPr>
-          <p:cNvPr id="19" name="CuadroTexto 18">
-            <a:extLst>
-              <a:ext uri="{FF2B5EF4-FFF2-40B4-BE49-F238E27FC236}">
-                <a16:creationId xmlns:a16="http://schemas.microsoft.com/office/drawing/2014/main" id="{654D80CF-744A-4F3A-862E-1C6364150E61}"/>
+        <p:txBody>
+          <a:bodyPr rtlCol="0" anchor="ctr"/>
+          <a:lstStyle/>
+          <a:p>
+            <a:pPr algn="ctr"/>
+            <a:endParaRPr lang="es-ES" dirty="0">
+              <a:solidFill>
+                <a:srgbClr val="FF0000"/>
+              </a:solidFill>
+              <a:highlight>
+                <a:srgbClr val="FF0000"/>
+              </a:highlight>
+            </a:endParaRPr>
+          </a:p>
+        </p:txBody>
+      </p:sp>
+      <p:sp>
+        <p:nvSpPr>
+          <p:cNvPr id="16" name="CuadroTexto 15">
+            <a:extLst>
+              <a:ext uri="{FF2B5EF4-FFF2-40B4-BE49-F238E27FC236}">
+                <a16:creationId xmlns:a16="http://schemas.microsoft.com/office/drawing/2014/main" id="{8D7EFB92-7FA5-46CA-86D7-6DF3898E5B52}"/>
               </a:ext>
             </a:extLst>
           </p:cNvPr>
@@ -5341,8 +5153,8 @@
         </p:nvSpPr>
         <p:spPr>
           <a:xfrm>
-            <a:off x="94775" y="4719493"/>
-            <a:ext cx="6107184" cy="923330"/>
+            <a:off x="4745106" y="5109433"/>
+            <a:ext cx="4670670" cy="646331"/>
           </a:xfrm>
           <a:prstGeom prst="rect">
             <a:avLst/>
@@ -5350,91 +5162,34 @@
           <a:noFill/>
         </p:spPr>
         <p:txBody>
-          <a:bodyPr wrap="square">
+          <a:bodyPr wrap="square" rtlCol="0">
             <a:spAutoFit/>
           </a:bodyPr>
           <a:lstStyle/>
           <a:p>
             <a:r>
+              <a:rPr lang="es-ES" b="1" i="1" dirty="0">
+                <a:latin typeface="LM Roman 10" panose="00000500000000000000" pitchFamily="50" charset="0"/>
+              </a:rPr>
+              <a:t>Gasolineras de España </a:t>
+            </a:r>
+          </a:p>
+          <a:p>
+            <a:r>
+              <a:rPr lang="es-ES" b="1" i="1" dirty="0">
+                <a:latin typeface="LM Roman 10" panose="00000500000000000000" pitchFamily="50" charset="0"/>
+              </a:rPr>
+              <a:t>- </a:t>
+            </a:r>
+            <a:r>
               <a:rPr lang="es-ES" dirty="0">
                 <a:latin typeface="LM Roman 10" panose="00000500000000000000" pitchFamily="50" charset="0"/>
               </a:rPr>
-              <a:t>Datos de API:</a:t>
-            </a:r>
-          </a:p>
-          <a:p>
-            <a:pPr marL="285750" indent="-285750">
-              <a:buFontTx/>
-              <a:buChar char="-"/>
-            </a:pPr>
-            <a:r>
-              <a:rPr lang="es-ES" dirty="0">
-                <a:latin typeface="LM Roman 10" panose="00000500000000000000" pitchFamily="50" charset="0"/>
-              </a:rPr>
-              <a:t>Red de carreteras</a:t>
-            </a:r>
-          </a:p>
-          <a:p>
-            <a:pPr marL="285750" indent="-285750">
-              <a:buFontTx/>
-              <a:buChar char="-"/>
-            </a:pPr>
-            <a:r>
-              <a:rPr lang="es-ES" dirty="0">
-                <a:solidFill>
-                  <a:srgbClr val="00B0F0"/>
-                </a:solidFill>
-                <a:latin typeface="LM Roman 10" panose="00000500000000000000" pitchFamily="50" charset="0"/>
-              </a:rPr>
-              <a:t>Volumen de tráfico</a:t>
-            </a:r>
-            <a:endParaRPr lang="es-ES" dirty="0">
-              <a:latin typeface="LM Roman 10" panose="00000500000000000000" pitchFamily="50" charset="0"/>
-            </a:endParaRPr>
-          </a:p>
-        </p:txBody>
-      </p:sp>
-      <p:cxnSp>
-        <p:nvCxnSpPr>
-          <p:cNvPr id="20" name="Conector recto de flecha 19">
-            <a:extLst>
-              <a:ext uri="{FF2B5EF4-FFF2-40B4-BE49-F238E27FC236}">
-                <a16:creationId xmlns:a16="http://schemas.microsoft.com/office/drawing/2014/main" id="{2F158AAB-572D-4AB5-BF80-456D94966595}"/>
-              </a:ext>
-            </a:extLst>
-          </p:cNvPr>
-          <p:cNvCxnSpPr>
-            <a:cxnSpLocks/>
-          </p:cNvCxnSpPr>
-          <p:nvPr/>
-        </p:nvCxnSpPr>
-        <p:spPr>
-          <a:xfrm flipV="1">
-            <a:off x="373891" y="5648844"/>
-            <a:ext cx="2070770" cy="653"/>
-          </a:xfrm>
-          <a:prstGeom prst="straightConnector1">
-            <a:avLst/>
-          </a:prstGeom>
-          <a:ln w="38100">
-            <a:tailEnd type="triangle"/>
-          </a:ln>
-        </p:spPr>
-        <p:style>
-          <a:lnRef idx="1">
-            <a:schemeClr val="dk1"/>
-          </a:lnRef>
-          <a:fillRef idx="0">
-            <a:schemeClr val="dk1"/>
-          </a:fillRef>
-          <a:effectRef idx="0">
-            <a:schemeClr val="dk1"/>
-          </a:effectRef>
-          <a:fontRef idx="minor">
-            <a:schemeClr val="tx1"/>
-          </a:fontRef>
-        </p:style>
-      </p:cxnSp>
+              <a:t>Nombre, dirección, coordenadas, ??</a:t>
+            </a:r>
+          </a:p>
+        </p:txBody>
+      </p:sp>
     </p:spTree>
     <p:extLst>
       <p:ext uri="{BB962C8B-B14F-4D97-AF65-F5344CB8AC3E}">

</xml_diff>